<commit_message>
Update the result of Week 5
</commit_message>
<xml_diff>
--- a/PPT/week5_필리핀 친구들 맞이할 준비하기_20250401.pptx
+++ b/PPT/week5_필리핀 친구들 맞이할 준비하기_20250401.pptx
@@ -264,7 +264,7 @@
           <a:p>
             <a:fld id="{31BC56AD-70B2-46BD-BB61-4D0D5F54A6B8}" type="datetimeFigureOut">
               <a:rPr lang="ko-KR" altLang="en-US" smtClean="0"/>
-              <a:t>2025-03-31</a:t>
+              <a:t>2025-04-01</a:t>
             </a:fld>
             <a:endParaRPr lang="ko-KR" altLang="en-US"/>
           </a:p>
@@ -462,7 +462,7 @@
           <a:p>
             <a:fld id="{31BC56AD-70B2-46BD-BB61-4D0D5F54A6B8}" type="datetimeFigureOut">
               <a:rPr lang="ko-KR" altLang="en-US" smtClean="0"/>
-              <a:t>2025-03-31</a:t>
+              <a:t>2025-04-01</a:t>
             </a:fld>
             <a:endParaRPr lang="ko-KR" altLang="en-US"/>
           </a:p>
@@ -670,7 +670,7 @@
           <a:p>
             <a:fld id="{31BC56AD-70B2-46BD-BB61-4D0D5F54A6B8}" type="datetimeFigureOut">
               <a:rPr lang="ko-KR" altLang="en-US" smtClean="0"/>
-              <a:t>2025-03-31</a:t>
+              <a:t>2025-04-01</a:t>
             </a:fld>
             <a:endParaRPr lang="ko-KR" altLang="en-US"/>
           </a:p>
@@ -868,7 +868,7 @@
           <a:p>
             <a:fld id="{31BC56AD-70B2-46BD-BB61-4D0D5F54A6B8}" type="datetimeFigureOut">
               <a:rPr lang="ko-KR" altLang="en-US" smtClean="0"/>
-              <a:t>2025-03-31</a:t>
+              <a:t>2025-04-01</a:t>
             </a:fld>
             <a:endParaRPr lang="ko-KR" altLang="en-US"/>
           </a:p>
@@ -1143,7 +1143,7 @@
           <a:p>
             <a:fld id="{31BC56AD-70B2-46BD-BB61-4D0D5F54A6B8}" type="datetimeFigureOut">
               <a:rPr lang="ko-KR" altLang="en-US" smtClean="0"/>
-              <a:t>2025-03-31</a:t>
+              <a:t>2025-04-01</a:t>
             </a:fld>
             <a:endParaRPr lang="ko-KR" altLang="en-US"/>
           </a:p>
@@ -1408,7 +1408,7 @@
           <a:p>
             <a:fld id="{31BC56AD-70B2-46BD-BB61-4D0D5F54A6B8}" type="datetimeFigureOut">
               <a:rPr lang="ko-KR" altLang="en-US" smtClean="0"/>
-              <a:t>2025-03-31</a:t>
+              <a:t>2025-04-01</a:t>
             </a:fld>
             <a:endParaRPr lang="ko-KR" altLang="en-US"/>
           </a:p>
@@ -1820,7 +1820,7 @@
           <a:p>
             <a:fld id="{31BC56AD-70B2-46BD-BB61-4D0D5F54A6B8}" type="datetimeFigureOut">
               <a:rPr lang="ko-KR" altLang="en-US" smtClean="0"/>
-              <a:t>2025-03-31</a:t>
+              <a:t>2025-04-01</a:t>
             </a:fld>
             <a:endParaRPr lang="ko-KR" altLang="en-US"/>
           </a:p>
@@ -1961,7 +1961,7 @@
           <a:p>
             <a:fld id="{31BC56AD-70B2-46BD-BB61-4D0D5F54A6B8}" type="datetimeFigureOut">
               <a:rPr lang="ko-KR" altLang="en-US" smtClean="0"/>
-              <a:t>2025-03-31</a:t>
+              <a:t>2025-04-01</a:t>
             </a:fld>
             <a:endParaRPr lang="ko-KR" altLang="en-US"/>
           </a:p>
@@ -2074,7 +2074,7 @@
           <a:p>
             <a:fld id="{31BC56AD-70B2-46BD-BB61-4D0D5F54A6B8}" type="datetimeFigureOut">
               <a:rPr lang="ko-KR" altLang="en-US" smtClean="0"/>
-              <a:t>2025-03-31</a:t>
+              <a:t>2025-04-01</a:t>
             </a:fld>
             <a:endParaRPr lang="ko-KR" altLang="en-US"/>
           </a:p>
@@ -2385,7 +2385,7 @@
           <a:p>
             <a:fld id="{31BC56AD-70B2-46BD-BB61-4D0D5F54A6B8}" type="datetimeFigureOut">
               <a:rPr lang="ko-KR" altLang="en-US" smtClean="0"/>
-              <a:t>2025-03-31</a:t>
+              <a:t>2025-04-01</a:t>
             </a:fld>
             <a:endParaRPr lang="ko-KR" altLang="en-US"/>
           </a:p>
@@ -2673,7 +2673,7 @@
           <a:p>
             <a:fld id="{31BC56AD-70B2-46BD-BB61-4D0D5F54A6B8}" type="datetimeFigureOut">
               <a:rPr lang="ko-KR" altLang="en-US" smtClean="0"/>
-              <a:t>2025-03-31</a:t>
+              <a:t>2025-04-01</a:t>
             </a:fld>
             <a:endParaRPr lang="ko-KR" altLang="en-US"/>
           </a:p>
@@ -2914,7 +2914,7 @@
           <a:p>
             <a:fld id="{31BC56AD-70B2-46BD-BB61-4D0D5F54A6B8}" type="datetimeFigureOut">
               <a:rPr lang="ko-KR" altLang="en-US" smtClean="0"/>
-              <a:t>2025-03-31</a:t>
+              <a:t>2025-04-01</a:t>
             </a:fld>
             <a:endParaRPr lang="ko-KR" altLang="en-US"/>
           </a:p>
@@ -3741,7 +3741,7 @@
             </a:r>
             <a:r>
               <a:rPr lang="en-US" altLang="ko-KR" dirty="0"/>
-              <a:t>: 1,707,221 </a:t>
+              <a:t>: 1,889,597 </a:t>
             </a:r>
             <a:r>
               <a:rPr lang="ko-KR" altLang="en-US" dirty="0"/>
@@ -3780,7 +3780,7 @@
             </a:r>
             <a:r>
               <a:rPr lang="en-US" altLang="ko-KR" dirty="0"/>
-              <a:t>: 1,465,952 </a:t>
+              <a:t>: 1,648,328 </a:t>
             </a:r>
             <a:r>
               <a:rPr lang="ko-KR" altLang="en-US" dirty="0"/>
@@ -3796,10 +3796,10 @@
       </p:sp>
       <p:pic>
         <p:nvPicPr>
-          <p:cNvPr id="3" name="그림 2">
-            <a:extLst>
-              <a:ext uri="{FF2B5EF4-FFF2-40B4-BE49-F238E27FC236}">
-                <a16:creationId xmlns:a16="http://schemas.microsoft.com/office/drawing/2014/main" id="{10575D95-F625-BEED-8341-145CB1EBBE47}"/>
+          <p:cNvPr id="4" name="그림 3">
+            <a:extLst>
+              <a:ext uri="{FF2B5EF4-FFF2-40B4-BE49-F238E27FC236}">
+                <a16:creationId xmlns:a16="http://schemas.microsoft.com/office/drawing/2014/main" id="{E0D9B90D-C9CB-D97B-6940-FF7652D04247}"/>
               </a:ext>
             </a:extLst>
           </p:cNvPr>
@@ -3816,8 +3816,8 @@
         </p:blipFill>
         <p:spPr>
           <a:xfrm>
-            <a:off x="5902399" y="662889"/>
-            <a:ext cx="5134692" cy="3629532"/>
+            <a:off x="313586" y="247206"/>
+            <a:ext cx="5306165" cy="6363588"/>
           </a:xfrm>
           <a:prstGeom prst="rect">
             <a:avLst/>
@@ -3826,10 +3826,10 @@
       </p:pic>
       <p:pic>
         <p:nvPicPr>
-          <p:cNvPr id="5" name="그림 4">
-            <a:extLst>
-              <a:ext uri="{FF2B5EF4-FFF2-40B4-BE49-F238E27FC236}">
-                <a16:creationId xmlns:a16="http://schemas.microsoft.com/office/drawing/2014/main" id="{58B0D2AD-A378-37CC-D042-5BE285B6D2AC}"/>
+          <p:cNvPr id="8" name="그림 7">
+            <a:extLst>
+              <a:ext uri="{FF2B5EF4-FFF2-40B4-BE49-F238E27FC236}">
+                <a16:creationId xmlns:a16="http://schemas.microsoft.com/office/drawing/2014/main" id="{3B8DC6AD-468A-9E6F-CF9E-6A50CCF621B7}"/>
               </a:ext>
             </a:extLst>
           </p:cNvPr>
@@ -3846,8 +3846,8 @@
         </p:blipFill>
         <p:spPr>
           <a:xfrm>
-            <a:off x="342164" y="461548"/>
-            <a:ext cx="5277587" cy="5934903"/>
+            <a:off x="6295668" y="247206"/>
+            <a:ext cx="5106113" cy="4048690"/>
           </a:xfrm>
           <a:prstGeom prst="rect">
             <a:avLst/>

</xml_diff>